<commit_message>
word documents style and updates 20241101, git_push.sh
</commit_message>
<xml_diff>
--- a/OWASP2021 Project progress meeting 20241024.pptx
+++ b/OWASP2021 Project progress meeting 20241024.pptx
@@ -108,6 +108,11 @@
       </a:defRPr>
     </a:lvl9pPr>
   </p:defaultTextStyle>
+  <p:extLst>
+    <p:ext uri="{EFAFB233-063F-42B5-8137-9DF3F51BA10A}">
+      <p15:sldGuideLst xmlns:p15="http://schemas.microsoft.com/office/powerpoint/2012/main"/>
+    </p:ext>
+  </p:extLst>
 </p:presentation>
 </file>
 
@@ -161,7 +166,7 @@
           <a:noFill/>
           <a:extLst>
             <a:ext uri="{909E8E84-426E-40dd-AFC4-6F175D3DCCD1}">
-              <a14:hiddenFill xmlns:a14="http://schemas.microsoft.com/office/drawing/2010/main" xmlns="">
+              <a14:hiddenFill xmlns="" xmlns:a14="http://schemas.microsoft.com/office/drawing/2010/main">
                 <a:solidFill>
                   <a:srgbClr val="FFFFFF"/>
                 </a:solidFill>
@@ -221,7 +226,7 @@
             </a:ln>
             <a:extLst>
               <a:ext uri="{91240B29-F687-4f45-9708-019B960494DF}">
-                <a14:hiddenLine xmlns:a14="http://schemas.microsoft.com/office/drawing/2010/main" xmlns="" w="9525">
+                <a14:hiddenLine xmlns="" xmlns:a14="http://schemas.microsoft.com/office/drawing/2010/main" w="9525">
                   <a:solidFill>
                     <a:srgbClr val="000000"/>
                   </a:solidFill>
@@ -311,7 +316,7 @@
             </a:ln>
             <a:extLst>
               <a:ext uri="{91240B29-F687-4f45-9708-019B960494DF}">
-                <a14:hiddenLine xmlns:a14="http://schemas.microsoft.com/office/drawing/2010/main" xmlns="" w="9525">
+                <a14:hiddenLine xmlns="" xmlns:a14="http://schemas.microsoft.com/office/drawing/2010/main" w="9525">
                   <a:solidFill>
                     <a:srgbClr val="000000"/>
                   </a:solidFill>
@@ -401,7 +406,7 @@
             </a:ln>
             <a:extLst>
               <a:ext uri="{91240B29-F687-4f45-9708-019B960494DF}">
-                <a14:hiddenLine xmlns:a14="http://schemas.microsoft.com/office/drawing/2010/main" xmlns="" w="9525">
+                <a14:hiddenLine xmlns="" xmlns:a14="http://schemas.microsoft.com/office/drawing/2010/main" w="9525">
                   <a:solidFill>
                     <a:srgbClr val="000000"/>
                   </a:solidFill>
@@ -435,7 +440,7 @@
             </a:ln>
             <a:extLst>
               <a:ext uri="{91240B29-F687-4f45-9708-019B960494DF}">
-                <a14:hiddenLine xmlns:a14="http://schemas.microsoft.com/office/drawing/2010/main" xmlns="" w="9525">
+                <a14:hiddenLine xmlns="" xmlns:a14="http://schemas.microsoft.com/office/drawing/2010/main" w="9525">
                   <a:solidFill>
                     <a:srgbClr val="000000"/>
                   </a:solidFill>
@@ -525,7 +530,7 @@
             </a:ln>
             <a:extLst>
               <a:ext uri="{91240B29-F687-4f45-9708-019B960494DF}">
-                <a14:hiddenLine xmlns:a14="http://schemas.microsoft.com/office/drawing/2010/main" xmlns="" w="9525">
+                <a14:hiddenLine xmlns="" xmlns:a14="http://schemas.microsoft.com/office/drawing/2010/main" w="9525">
                   <a:solidFill>
                     <a:srgbClr val="000000"/>
                   </a:solidFill>
@@ -587,7 +592,7 @@
             </a:ln>
             <a:extLst>
               <a:ext uri="{91240B29-F687-4f45-9708-019B960494DF}">
-                <a14:hiddenLine xmlns:a14="http://schemas.microsoft.com/office/drawing/2010/main" xmlns="" w="9525">
+                <a14:hiddenLine xmlns="" xmlns:a14="http://schemas.microsoft.com/office/drawing/2010/main" w="9525">
                   <a:solidFill>
                     <a:srgbClr val="000000"/>
                   </a:solidFill>
@@ -649,7 +654,7 @@
             </a:ln>
             <a:extLst>
               <a:ext uri="{91240B29-F687-4f45-9708-019B960494DF}">
-                <a14:hiddenLine xmlns:a14="http://schemas.microsoft.com/office/drawing/2010/main" xmlns="" w="9525">
+                <a14:hiddenLine xmlns="" xmlns:a14="http://schemas.microsoft.com/office/drawing/2010/main" w="9525">
                   <a:solidFill>
                     <a:srgbClr val="000000"/>
                   </a:solidFill>
@@ -739,7 +744,7 @@
             </a:ln>
             <a:extLst>
               <a:ext uri="{91240B29-F687-4f45-9708-019B960494DF}">
-                <a14:hiddenLine xmlns:a14="http://schemas.microsoft.com/office/drawing/2010/main" xmlns="" w="9525">
+                <a14:hiddenLine xmlns="" xmlns:a14="http://schemas.microsoft.com/office/drawing/2010/main" w="9525">
                   <a:solidFill>
                     <a:srgbClr val="000000"/>
                   </a:solidFill>
@@ -801,7 +806,7 @@
             </a:ln>
             <a:extLst>
               <a:ext uri="{91240B29-F687-4f45-9708-019B960494DF}">
-                <a14:hiddenLine xmlns:a14="http://schemas.microsoft.com/office/drawing/2010/main" xmlns="" w="9525">
+                <a14:hiddenLine xmlns="" xmlns:a14="http://schemas.microsoft.com/office/drawing/2010/main" w="9525">
                   <a:solidFill>
                     <a:srgbClr val="000000"/>
                   </a:solidFill>
@@ -863,7 +868,7 @@
             </a:ln>
             <a:extLst>
               <a:ext uri="{91240B29-F687-4f45-9708-019B960494DF}">
-                <a14:hiddenLine xmlns:a14="http://schemas.microsoft.com/office/drawing/2010/main" xmlns="" w="9525">
+                <a14:hiddenLine xmlns="" xmlns:a14="http://schemas.microsoft.com/office/drawing/2010/main" w="9525">
                   <a:solidFill>
                     <a:srgbClr val="000000"/>
                   </a:solidFill>
@@ -953,7 +958,7 @@
             </a:ln>
             <a:extLst>
               <a:ext uri="{91240B29-F687-4f45-9708-019B960494DF}">
-                <a14:hiddenLine xmlns:a14="http://schemas.microsoft.com/office/drawing/2010/main" xmlns="" w="9525">
+                <a14:hiddenLine xmlns="" xmlns:a14="http://schemas.microsoft.com/office/drawing/2010/main" w="9525">
                   <a:solidFill>
                     <a:srgbClr val="000000"/>
                   </a:solidFill>
@@ -1043,7 +1048,7 @@
             </a:ln>
             <a:extLst>
               <a:ext uri="{91240B29-F687-4f45-9708-019B960494DF}">
-                <a14:hiddenLine xmlns:a14="http://schemas.microsoft.com/office/drawing/2010/main" xmlns="" w="9525">
+                <a14:hiddenLine xmlns="" xmlns:a14="http://schemas.microsoft.com/office/drawing/2010/main" w="9525">
                   <a:solidFill>
                     <a:srgbClr val="000000"/>
                   </a:solidFill>
@@ -1105,7 +1110,7 @@
             </a:ln>
             <a:extLst>
               <a:ext uri="{91240B29-F687-4f45-9708-019B960494DF}">
-                <a14:hiddenLine xmlns:a14="http://schemas.microsoft.com/office/drawing/2010/main" xmlns="" w="9525">
+                <a14:hiddenLine xmlns="" xmlns:a14="http://schemas.microsoft.com/office/drawing/2010/main" w="9525">
                   <a:solidFill>
                     <a:srgbClr val="000000"/>
                   </a:solidFill>
@@ -1215,7 +1220,7 @@
             </a:ln>
             <a:extLst>
               <a:ext uri="{91240B29-F687-4f45-9708-019B960494DF}">
-                <a14:hiddenLine xmlns:a14="http://schemas.microsoft.com/office/drawing/2010/main" xmlns="" w="9525">
+                <a14:hiddenLine xmlns="" xmlns:a14="http://schemas.microsoft.com/office/drawing/2010/main" w="9525">
                   <a:solidFill>
                     <a:srgbClr val="000000"/>
                   </a:solidFill>
@@ -1277,7 +1282,7 @@
             </a:ln>
             <a:extLst>
               <a:ext uri="{91240B29-F687-4f45-9708-019B960494DF}">
-                <a14:hiddenLine xmlns:a14="http://schemas.microsoft.com/office/drawing/2010/main" xmlns="" w="9525">
+                <a14:hiddenLine xmlns="" xmlns:a14="http://schemas.microsoft.com/office/drawing/2010/main" w="9525">
                   <a:solidFill>
                     <a:srgbClr val="000000"/>
                   </a:solidFill>
@@ -1367,7 +1372,7 @@
             </a:ln>
             <a:extLst>
               <a:ext uri="{91240B29-F687-4f45-9708-019B960494DF}">
-                <a14:hiddenLine xmlns:a14="http://schemas.microsoft.com/office/drawing/2010/main" xmlns="" w="9525">
+                <a14:hiddenLine xmlns="" xmlns:a14="http://schemas.microsoft.com/office/drawing/2010/main" w="9525">
                   <a:solidFill>
                     <a:srgbClr val="000000"/>
                   </a:solidFill>
@@ -1457,7 +1462,7 @@
             </a:ln>
             <a:extLst>
               <a:ext uri="{91240B29-F687-4f45-9708-019B960494DF}">
-                <a14:hiddenLine xmlns:a14="http://schemas.microsoft.com/office/drawing/2010/main" xmlns="" w="9525">
+                <a14:hiddenLine xmlns="" xmlns:a14="http://schemas.microsoft.com/office/drawing/2010/main" w="9525">
                   <a:solidFill>
                     <a:srgbClr val="000000"/>
                   </a:solidFill>
@@ -1519,7 +1524,7 @@
             </a:ln>
             <a:extLst>
               <a:ext uri="{91240B29-F687-4f45-9708-019B960494DF}">
-                <a14:hiddenLine xmlns:a14="http://schemas.microsoft.com/office/drawing/2010/main" xmlns="" w="9525">
+                <a14:hiddenLine xmlns="" xmlns:a14="http://schemas.microsoft.com/office/drawing/2010/main" w="9525">
                   <a:solidFill>
                     <a:srgbClr val="000000"/>
                   </a:solidFill>
@@ -1609,7 +1614,7 @@
             </a:ln>
             <a:extLst>
               <a:ext uri="{91240B29-F687-4f45-9708-019B960494DF}">
-                <a14:hiddenLine xmlns:a14="http://schemas.microsoft.com/office/drawing/2010/main" xmlns="" w="9525">
+                <a14:hiddenLine xmlns="" xmlns:a14="http://schemas.microsoft.com/office/drawing/2010/main" w="9525">
                   <a:solidFill>
                     <a:srgbClr val="000000"/>
                   </a:solidFill>
@@ -1699,7 +1704,7 @@
             </a:ln>
             <a:extLst>
               <a:ext uri="{91240B29-F687-4f45-9708-019B960494DF}">
-                <a14:hiddenLine xmlns:a14="http://schemas.microsoft.com/office/drawing/2010/main" xmlns="" w="9525">
+                <a14:hiddenLine xmlns="" xmlns:a14="http://schemas.microsoft.com/office/drawing/2010/main" w="9525">
                   <a:solidFill>
                     <a:srgbClr val="000000"/>
                   </a:solidFill>
@@ -1755,7 +1760,7 @@
             </a:ln>
             <a:extLst>
               <a:ext uri="{91240B29-F687-4f45-9708-019B960494DF}">
-                <a14:hiddenLine xmlns:a14="http://schemas.microsoft.com/office/drawing/2010/main" xmlns="" w="9525">
+                <a14:hiddenLine xmlns="" xmlns:a14="http://schemas.microsoft.com/office/drawing/2010/main" w="9525">
                   <a:solidFill>
                     <a:srgbClr val="000000"/>
                   </a:solidFill>
@@ -1845,7 +1850,7 @@
             </a:ln>
             <a:extLst>
               <a:ext uri="{91240B29-F687-4f45-9708-019B960494DF}">
-                <a14:hiddenLine xmlns:a14="http://schemas.microsoft.com/office/drawing/2010/main" xmlns="" w="9525">
+                <a14:hiddenLine xmlns="" xmlns:a14="http://schemas.microsoft.com/office/drawing/2010/main" w="9525">
                   <a:solidFill>
                     <a:srgbClr val="000000"/>
                   </a:solidFill>
@@ -1901,7 +1906,7 @@
             </a:ln>
             <a:extLst>
               <a:ext uri="{91240B29-F687-4f45-9708-019B960494DF}">
-                <a14:hiddenLine xmlns:a14="http://schemas.microsoft.com/office/drawing/2010/main" xmlns="" w="9525">
+                <a14:hiddenLine xmlns="" xmlns:a14="http://schemas.microsoft.com/office/drawing/2010/main" w="9525">
                   <a:solidFill>
                     <a:srgbClr val="000000"/>
                   </a:solidFill>
@@ -1991,7 +1996,7 @@
             </a:ln>
             <a:extLst>
               <a:ext uri="{91240B29-F687-4f45-9708-019B960494DF}">
-                <a14:hiddenLine xmlns:a14="http://schemas.microsoft.com/office/drawing/2010/main" xmlns="" w="9525">
+                <a14:hiddenLine xmlns="" xmlns:a14="http://schemas.microsoft.com/office/drawing/2010/main" w="9525">
                   <a:solidFill>
                     <a:srgbClr val="000000"/>
                   </a:solidFill>
@@ -2059,7 +2064,7 @@
             </a:ln>
             <a:extLst>
               <a:ext uri="{91240B29-F687-4f45-9708-019B960494DF}">
-                <a14:hiddenLine xmlns:a14="http://schemas.microsoft.com/office/drawing/2010/main" xmlns="" w="9525">
+                <a14:hiddenLine xmlns="" xmlns:a14="http://schemas.microsoft.com/office/drawing/2010/main" w="9525">
                   <a:solidFill>
                     <a:srgbClr val="000000"/>
                   </a:solidFill>
@@ -2149,7 +2154,7 @@
             </a:ln>
             <a:extLst>
               <a:ext uri="{91240B29-F687-4f45-9708-019B960494DF}">
-                <a14:hiddenLine xmlns:a14="http://schemas.microsoft.com/office/drawing/2010/main" xmlns="" w="9525">
+                <a14:hiddenLine xmlns="" xmlns:a14="http://schemas.microsoft.com/office/drawing/2010/main" w="9525">
                   <a:solidFill>
                     <a:srgbClr val="000000"/>
                   </a:solidFill>
@@ -2217,7 +2222,7 @@
             </a:ln>
             <a:extLst>
               <a:ext uri="{91240B29-F687-4f45-9708-019B960494DF}">
-                <a14:hiddenLine xmlns:a14="http://schemas.microsoft.com/office/drawing/2010/main" xmlns="" w="9525">
+                <a14:hiddenLine xmlns="" xmlns:a14="http://schemas.microsoft.com/office/drawing/2010/main" w="9525">
                   <a:solidFill>
                     <a:srgbClr val="000000"/>
                   </a:solidFill>
@@ -2307,7 +2312,7 @@
             </a:ln>
             <a:extLst>
               <a:ext uri="{91240B29-F687-4f45-9708-019B960494DF}">
-                <a14:hiddenLine xmlns:a14="http://schemas.microsoft.com/office/drawing/2010/main" xmlns="" w="9525">
+                <a14:hiddenLine xmlns="" xmlns:a14="http://schemas.microsoft.com/office/drawing/2010/main" w="9525">
                   <a:solidFill>
                     <a:srgbClr val="000000"/>
                   </a:solidFill>
@@ -2341,7 +2346,7 @@
             </a:ln>
             <a:extLst>
               <a:ext uri="{91240B29-F687-4f45-9708-019B960494DF}">
-                <a14:hiddenLine xmlns:a14="http://schemas.microsoft.com/office/drawing/2010/main" xmlns="" w="9525">
+                <a14:hiddenLine xmlns="" xmlns:a14="http://schemas.microsoft.com/office/drawing/2010/main" w="9525">
                   <a:solidFill>
                     <a:srgbClr val="000000"/>
                   </a:solidFill>
@@ -2431,7 +2436,7 @@
             </a:ln>
             <a:extLst>
               <a:ext uri="{91240B29-F687-4f45-9708-019B960494DF}">
-                <a14:hiddenLine xmlns:a14="http://schemas.microsoft.com/office/drawing/2010/main" xmlns="" w="9525">
+                <a14:hiddenLine xmlns="" xmlns:a14="http://schemas.microsoft.com/office/drawing/2010/main" w="9525">
                   <a:solidFill>
                     <a:srgbClr val="000000"/>
                   </a:solidFill>
@@ -2493,7 +2498,7 @@
             </a:ln>
             <a:extLst>
               <a:ext uri="{91240B29-F687-4f45-9708-019B960494DF}">
-                <a14:hiddenLine xmlns:a14="http://schemas.microsoft.com/office/drawing/2010/main" xmlns="" w="9525">
+                <a14:hiddenLine xmlns="" xmlns:a14="http://schemas.microsoft.com/office/drawing/2010/main" w="9525">
                   <a:solidFill>
                     <a:srgbClr val="000000"/>
                   </a:solidFill>
@@ -2555,7 +2560,7 @@
             </a:ln>
             <a:extLst>
               <a:ext uri="{91240B29-F687-4f45-9708-019B960494DF}">
-                <a14:hiddenLine xmlns:a14="http://schemas.microsoft.com/office/drawing/2010/main" xmlns="" w="9525">
+                <a14:hiddenLine xmlns="" xmlns:a14="http://schemas.microsoft.com/office/drawing/2010/main" w="9525">
                   <a:solidFill>
                     <a:srgbClr val="000000"/>
                   </a:solidFill>
@@ -2645,7 +2650,7 @@
             </a:ln>
             <a:extLst>
               <a:ext uri="{91240B29-F687-4f45-9708-019B960494DF}">
-                <a14:hiddenLine xmlns:a14="http://schemas.microsoft.com/office/drawing/2010/main" xmlns="" w="9525">
+                <a14:hiddenLine xmlns="" xmlns:a14="http://schemas.microsoft.com/office/drawing/2010/main" w="9525">
                   <a:solidFill>
                     <a:srgbClr val="000000"/>
                   </a:solidFill>
@@ -2713,7 +2718,7 @@
             </a:ln>
             <a:extLst>
               <a:ext uri="{91240B29-F687-4f45-9708-019B960494DF}">
-                <a14:hiddenLine xmlns:a14="http://schemas.microsoft.com/office/drawing/2010/main" xmlns="" w="9525">
+                <a14:hiddenLine xmlns="" xmlns:a14="http://schemas.microsoft.com/office/drawing/2010/main" w="9525">
                   <a:solidFill>
                     <a:srgbClr val="000000"/>
                   </a:solidFill>
@@ -2775,7 +2780,7 @@
             </a:ln>
             <a:extLst>
               <a:ext uri="{91240B29-F687-4f45-9708-019B960494DF}">
-                <a14:hiddenLine xmlns:a14="http://schemas.microsoft.com/office/drawing/2010/main" xmlns="" w="9525">
+                <a14:hiddenLine xmlns="" xmlns:a14="http://schemas.microsoft.com/office/drawing/2010/main" w="9525">
                   <a:solidFill>
                     <a:srgbClr val="000000"/>
                   </a:solidFill>
@@ -2865,7 +2870,7 @@
             </a:ln>
             <a:extLst>
               <a:ext uri="{91240B29-F687-4f45-9708-019B960494DF}">
-                <a14:hiddenLine xmlns:a14="http://schemas.microsoft.com/office/drawing/2010/main" xmlns="" w="9525">
+                <a14:hiddenLine xmlns="" xmlns:a14="http://schemas.microsoft.com/office/drawing/2010/main" w="9525">
                   <a:solidFill>
                     <a:srgbClr val="000000"/>
                   </a:solidFill>
@@ -2927,7 +2932,7 @@
             </a:ln>
             <a:extLst>
               <a:ext uri="{91240B29-F687-4f45-9708-019B960494DF}">
-                <a14:hiddenLine xmlns:a14="http://schemas.microsoft.com/office/drawing/2010/main" xmlns="" w="9525">
+                <a14:hiddenLine xmlns="" xmlns:a14="http://schemas.microsoft.com/office/drawing/2010/main" w="9525">
                   <a:solidFill>
                     <a:srgbClr val="000000"/>
                   </a:solidFill>
@@ -3017,7 +3022,7 @@
             </a:ln>
             <a:extLst>
               <a:ext uri="{91240B29-F687-4f45-9708-019B960494DF}">
-                <a14:hiddenLine xmlns:a14="http://schemas.microsoft.com/office/drawing/2010/main" xmlns="" w="9525">
+                <a14:hiddenLine xmlns="" xmlns:a14="http://schemas.microsoft.com/office/drawing/2010/main" w="9525">
                   <a:solidFill>
                     <a:srgbClr val="000000"/>
                   </a:solidFill>
@@ -3079,7 +3084,7 @@
             </a:ln>
             <a:extLst>
               <a:ext uri="{91240B29-F687-4f45-9708-019B960494DF}">
-                <a14:hiddenLine xmlns:a14="http://schemas.microsoft.com/office/drawing/2010/main" xmlns="" w="9525">
+                <a14:hiddenLine xmlns="" xmlns:a14="http://schemas.microsoft.com/office/drawing/2010/main" w="9525">
                   <a:solidFill>
                     <a:srgbClr val="000000"/>
                   </a:solidFill>
@@ -3169,7 +3174,7 @@
             </a:ln>
             <a:extLst>
               <a:ext uri="{91240B29-F687-4f45-9708-019B960494DF}">
-                <a14:hiddenLine xmlns:a14="http://schemas.microsoft.com/office/drawing/2010/main" xmlns="" w="9525">
+                <a14:hiddenLine xmlns="" xmlns:a14="http://schemas.microsoft.com/office/drawing/2010/main" w="9525">
                   <a:solidFill>
                     <a:srgbClr val="000000"/>
                   </a:solidFill>
@@ -3203,7 +3208,7 @@
             </a:ln>
             <a:extLst>
               <a:ext uri="{91240B29-F687-4f45-9708-019B960494DF}">
-                <a14:hiddenLine xmlns:a14="http://schemas.microsoft.com/office/drawing/2010/main" xmlns="" w="9525">
+                <a14:hiddenLine xmlns="" xmlns:a14="http://schemas.microsoft.com/office/drawing/2010/main" w="9525">
                   <a:solidFill>
                     <a:srgbClr val="000000"/>
                   </a:solidFill>
@@ -3268,7 +3273,7 @@
             </a:ln>
             <a:extLst>
               <a:ext uri="{91240B29-F687-4f45-9708-019B960494DF}">
-                <a14:hiddenLine xmlns:a14="http://schemas.microsoft.com/office/drawing/2010/main" xmlns="" w="9525">
+                <a14:hiddenLine xmlns="" xmlns:a14="http://schemas.microsoft.com/office/drawing/2010/main" w="9525">
                   <a:solidFill>
                     <a:srgbClr val="000000"/>
                   </a:solidFill>
@@ -3358,7 +3363,7 @@
             </a:ln>
             <a:extLst>
               <a:ext uri="{91240B29-F687-4f45-9708-019B960494DF}">
-                <a14:hiddenLine xmlns:a14="http://schemas.microsoft.com/office/drawing/2010/main" xmlns="" w="9525">
+                <a14:hiddenLine xmlns="" xmlns:a14="http://schemas.microsoft.com/office/drawing/2010/main" w="9525">
                   <a:solidFill>
                     <a:srgbClr val="000000"/>
                   </a:solidFill>
@@ -3420,7 +3425,7 @@
             </a:ln>
             <a:extLst>
               <a:ext uri="{91240B29-F687-4f45-9708-019B960494DF}">
-                <a14:hiddenLine xmlns:a14="http://schemas.microsoft.com/office/drawing/2010/main" xmlns="" w="9525">
+                <a14:hiddenLine xmlns="" xmlns:a14="http://schemas.microsoft.com/office/drawing/2010/main" w="9525">
                   <a:solidFill>
                     <a:srgbClr val="000000"/>
                   </a:solidFill>
@@ -3510,7 +3515,7 @@
             </a:ln>
             <a:extLst>
               <a:ext uri="{91240B29-F687-4f45-9708-019B960494DF}">
-                <a14:hiddenLine xmlns:a14="http://schemas.microsoft.com/office/drawing/2010/main" xmlns="" w="9525">
+                <a14:hiddenLine xmlns="" xmlns:a14="http://schemas.microsoft.com/office/drawing/2010/main" w="9525">
                   <a:solidFill>
                     <a:srgbClr val="000000"/>
                   </a:solidFill>
@@ -3600,7 +3605,7 @@
             </a:ln>
             <a:extLst>
               <a:ext uri="{91240B29-F687-4f45-9708-019B960494DF}">
-                <a14:hiddenLine xmlns:a14="http://schemas.microsoft.com/office/drawing/2010/main" xmlns="" w="9525">
+                <a14:hiddenLine xmlns="" xmlns:a14="http://schemas.microsoft.com/office/drawing/2010/main" w="9525">
                   <a:solidFill>
                     <a:srgbClr val="000000"/>
                   </a:solidFill>
@@ -3665,7 +3670,7 @@
             </a:ln>
             <a:extLst>
               <a:ext uri="{91240B29-F687-4f45-9708-019B960494DF}">
-                <a14:hiddenLine xmlns:a14="http://schemas.microsoft.com/office/drawing/2010/main" xmlns="" w="9525">
+                <a14:hiddenLine xmlns="" xmlns:a14="http://schemas.microsoft.com/office/drawing/2010/main" w="9525">
                   <a:solidFill>
                     <a:srgbClr val="000000"/>
                   </a:solidFill>
@@ -3727,7 +3732,7 @@
             </a:ln>
             <a:extLst>
               <a:ext uri="{91240B29-F687-4f45-9708-019B960494DF}">
-                <a14:hiddenLine xmlns:a14="http://schemas.microsoft.com/office/drawing/2010/main" xmlns="" w="9525">
+                <a14:hiddenLine xmlns="" xmlns:a14="http://schemas.microsoft.com/office/drawing/2010/main" w="9525">
                   <a:solidFill>
                     <a:srgbClr val="000000"/>
                   </a:solidFill>
@@ -3817,7 +3822,7 @@
             </a:ln>
             <a:extLst>
               <a:ext uri="{91240B29-F687-4f45-9708-019B960494DF}">
-                <a14:hiddenLine xmlns:a14="http://schemas.microsoft.com/office/drawing/2010/main" xmlns="" w="9525">
+                <a14:hiddenLine xmlns="" xmlns:a14="http://schemas.microsoft.com/office/drawing/2010/main" w="9525">
                   <a:solidFill>
                     <a:srgbClr val="000000"/>
                   </a:solidFill>
@@ -3907,7 +3912,7 @@
             </a:ln>
             <a:extLst>
               <a:ext uri="{91240B29-F687-4f45-9708-019B960494DF}">
-                <a14:hiddenLine xmlns:a14="http://schemas.microsoft.com/office/drawing/2010/main" xmlns="" w="9525">
+                <a14:hiddenLine xmlns="" xmlns:a14="http://schemas.microsoft.com/office/drawing/2010/main" w="9525">
                   <a:solidFill>
                     <a:srgbClr val="000000"/>
                   </a:solidFill>
@@ -3969,7 +3974,7 @@
             </a:ln>
             <a:extLst>
               <a:ext uri="{91240B29-F687-4f45-9708-019B960494DF}">
-                <a14:hiddenLine xmlns:a14="http://schemas.microsoft.com/office/drawing/2010/main" xmlns="" w="9525">
+                <a14:hiddenLine xmlns="" xmlns:a14="http://schemas.microsoft.com/office/drawing/2010/main" w="9525">
                   <a:solidFill>
                     <a:srgbClr val="000000"/>
                   </a:solidFill>
@@ -4089,7 +4094,7 @@
             </a:ln>
             <a:extLst>
               <a:ext uri="{91240B29-F687-4f45-9708-019B960494DF}">
-                <a14:hiddenLine xmlns:a14="http://schemas.microsoft.com/office/drawing/2010/main" xmlns="" w="9525">
+                <a14:hiddenLine xmlns="" xmlns:a14="http://schemas.microsoft.com/office/drawing/2010/main" w="9525">
                   <a:solidFill>
                     <a:srgbClr val="000000"/>
                   </a:solidFill>
@@ -4157,7 +4162,7 @@
             </a:ln>
             <a:extLst>
               <a:ext uri="{91240B29-F687-4f45-9708-019B960494DF}">
-                <a14:hiddenLine xmlns:a14="http://schemas.microsoft.com/office/drawing/2010/main" xmlns="" w="9525">
+                <a14:hiddenLine xmlns="" xmlns:a14="http://schemas.microsoft.com/office/drawing/2010/main" w="9525">
                   <a:solidFill>
                     <a:srgbClr val="000000"/>
                   </a:solidFill>
@@ -4247,7 +4252,7 @@
             </a:ln>
             <a:extLst>
               <a:ext uri="{91240B29-F687-4f45-9708-019B960494DF}">
-                <a14:hiddenLine xmlns:a14="http://schemas.microsoft.com/office/drawing/2010/main" xmlns="" w="9525">
+                <a14:hiddenLine xmlns="" xmlns:a14="http://schemas.microsoft.com/office/drawing/2010/main" w="9525">
                   <a:solidFill>
                     <a:srgbClr val="000000"/>
                   </a:solidFill>
@@ -4387,7 +4392,7 @@
           <a:p>
             <a:fld id="{48A87A34-81AB-432B-8DAE-1953F412C126}" type="datetimeFigureOut">
               <a:rPr lang="en-US" dirty="0"/>
-              <a:t>10/23/24</a:t>
+              <a:t>10/24/24</a:t>
             </a:fld>
             <a:endParaRPr lang="en-US" dirty="0"/>
           </a:p>
@@ -4649,7 +4654,7 @@
           <a:p>
             <a:fld id="{48A87A34-81AB-432B-8DAE-1953F412C126}" type="datetimeFigureOut">
               <a:rPr lang="en-US" dirty="0"/>
-              <a:t>10/23/24</a:t>
+              <a:t>10/24/24</a:t>
             </a:fld>
             <a:endParaRPr lang="en-US" dirty="0"/>
           </a:p>
@@ -4840,7 +4845,7 @@
           <a:p>
             <a:fld id="{48A87A34-81AB-432B-8DAE-1953F412C126}" type="datetimeFigureOut">
               <a:rPr lang="en-US" dirty="0"/>
-              <a:t>10/23/24</a:t>
+              <a:t>10/24/24</a:t>
             </a:fld>
             <a:endParaRPr lang="en-US" dirty="0"/>
           </a:p>
@@ -5098,7 +5103,7 @@
           <a:p>
             <a:fld id="{48A87A34-81AB-432B-8DAE-1953F412C126}" type="datetimeFigureOut">
               <a:rPr lang="en-US" dirty="0"/>
-              <a:t>10/23/24</a:t>
+              <a:t>10/24/24</a:t>
             </a:fld>
             <a:endParaRPr lang="en-US" dirty="0"/>
           </a:p>
@@ -5527,7 +5532,7 @@
           <a:p>
             <a:fld id="{48A87A34-81AB-432B-8DAE-1953F412C126}" type="datetimeFigureOut">
               <a:rPr lang="en-US" dirty="0"/>
-              <a:t>10/23/24</a:t>
+              <a:t>10/24/24</a:t>
             </a:fld>
             <a:endParaRPr lang="en-US" dirty="0"/>
           </a:p>
@@ -6068,7 +6073,7 @@
           <a:p>
             <a:fld id="{48A87A34-81AB-432B-8DAE-1953F412C126}" type="datetimeFigureOut">
               <a:rPr lang="en-US" dirty="0"/>
-              <a:t>10/23/24</a:t>
+              <a:t>10/24/24</a:t>
             </a:fld>
             <a:endParaRPr lang="en-US" dirty="0"/>
           </a:p>
@@ -6783,7 +6788,7 @@
           <a:p>
             <a:fld id="{48A87A34-81AB-432B-8DAE-1953F412C126}" type="datetimeFigureOut">
               <a:rPr lang="en-US" dirty="0"/>
-              <a:t>10/23/24</a:t>
+              <a:t>10/24/24</a:t>
             </a:fld>
             <a:endParaRPr lang="en-US" dirty="0"/>
           </a:p>
@@ -6948,7 +6953,7 @@
           <a:p>
             <a:fld id="{48A87A34-81AB-432B-8DAE-1953F412C126}" type="datetimeFigureOut">
               <a:rPr lang="en-US" dirty="0"/>
-              <a:t>10/23/24</a:t>
+              <a:t>10/24/24</a:t>
             </a:fld>
             <a:endParaRPr lang="en-US" dirty="0"/>
           </a:p>
@@ -7123,7 +7128,7 @@
           <a:p>
             <a:fld id="{48A87A34-81AB-432B-8DAE-1953F412C126}" type="datetimeFigureOut">
               <a:rPr lang="en-US" dirty="0"/>
-              <a:t>10/23/24</a:t>
+              <a:t>10/24/24</a:t>
             </a:fld>
             <a:endParaRPr lang="en-US" dirty="0"/>
           </a:p>
@@ -7288,7 +7293,7 @@
           <a:p>
             <a:fld id="{48A87A34-81AB-432B-8DAE-1953F412C126}" type="datetimeFigureOut">
               <a:rPr lang="en-US" dirty="0"/>
-              <a:t>10/23/24</a:t>
+              <a:t>10/24/24</a:t>
             </a:fld>
             <a:endParaRPr lang="en-US" dirty="0"/>
           </a:p>
@@ -7533,7 +7538,7 @@
           <a:p>
             <a:fld id="{48A87A34-81AB-432B-8DAE-1953F412C126}" type="datetimeFigureOut">
               <a:rPr lang="en-US" dirty="0"/>
-              <a:t>10/23/24</a:t>
+              <a:t>10/24/24</a:t>
             </a:fld>
             <a:endParaRPr lang="en-US" dirty="0"/>
           </a:p>
@@ -7760,7 +7765,7 @@
           <a:p>
             <a:fld id="{48A87A34-81AB-432B-8DAE-1953F412C126}" type="datetimeFigureOut">
               <a:rPr lang="en-US" dirty="0"/>
-              <a:t>10/23/24</a:t>
+              <a:t>10/24/24</a:t>
             </a:fld>
             <a:endParaRPr lang="en-US" dirty="0"/>
           </a:p>
@@ -8136,7 +8141,7 @@
           <a:p>
             <a:fld id="{48A87A34-81AB-432B-8DAE-1953F412C126}" type="datetimeFigureOut">
               <a:rPr lang="en-US" dirty="0"/>
-              <a:t>10/23/24</a:t>
+              <a:t>10/24/24</a:t>
             </a:fld>
             <a:endParaRPr lang="en-US" dirty="0"/>
           </a:p>
@@ -8249,7 +8254,7 @@
           <a:p>
             <a:fld id="{48A87A34-81AB-432B-8DAE-1953F412C126}" type="datetimeFigureOut">
               <a:rPr lang="en-US" dirty="0"/>
-              <a:t>10/23/24</a:t>
+              <a:t>10/24/24</a:t>
             </a:fld>
             <a:endParaRPr lang="en-US" dirty="0"/>
           </a:p>
@@ -8339,7 +8344,7 @@
           <a:p>
             <a:fld id="{48A87A34-81AB-432B-8DAE-1953F412C126}" type="datetimeFigureOut">
               <a:rPr lang="en-US" dirty="0"/>
-              <a:t>10/23/24</a:t>
+              <a:t>10/24/24</a:t>
             </a:fld>
             <a:endParaRPr lang="en-US" dirty="0"/>
           </a:p>
@@ -8583,7 +8588,7 @@
           <a:p>
             <a:fld id="{48A87A34-81AB-432B-8DAE-1953F412C126}" type="datetimeFigureOut">
               <a:rPr lang="en-US" dirty="0"/>
-              <a:t>10/23/24</a:t>
+              <a:t>10/24/24</a:t>
             </a:fld>
             <a:endParaRPr lang="en-US" dirty="0"/>
           </a:p>
@@ -8858,7 +8863,7 @@
           <a:p>
             <a:fld id="{48A87A34-81AB-432B-8DAE-1953F412C126}" type="datetimeFigureOut">
               <a:rPr lang="en-US" dirty="0"/>
-              <a:t>10/23/24</a:t>
+              <a:t>10/24/24</a:t>
             </a:fld>
             <a:endParaRPr lang="en-US" dirty="0"/>
           </a:p>
@@ -8969,7 +8974,7 @@
           <a:noFill/>
           <a:extLst>
             <a:ext uri="{909E8E84-426E-40dd-AFC4-6F175D3DCCD1}">
-              <a14:hiddenFill xmlns:a14="http://schemas.microsoft.com/office/drawing/2010/main" xmlns="">
+              <a14:hiddenFill xmlns="" xmlns:a14="http://schemas.microsoft.com/office/drawing/2010/main">
                 <a:solidFill>
                   <a:srgbClr val="FFFFFF"/>
                 </a:solidFill>
@@ -9043,7 +9048,7 @@
               </a:ln>
               <a:extLst>
                 <a:ext uri="{91240B29-F687-4f45-9708-019B960494DF}">
-                  <a14:hiddenLine xmlns:a14="http://schemas.microsoft.com/office/drawing/2010/main" xmlns="" w="9525">
+                  <a14:hiddenLine xmlns="" xmlns:a14="http://schemas.microsoft.com/office/drawing/2010/main" w="9525">
                     <a:solidFill>
                       <a:srgbClr val="000000"/>
                     </a:solidFill>
@@ -9133,7 +9138,7 @@
               </a:ln>
               <a:extLst>
                 <a:ext uri="{91240B29-F687-4f45-9708-019B960494DF}">
-                  <a14:hiddenLine xmlns:a14="http://schemas.microsoft.com/office/drawing/2010/main" xmlns="" w="9525">
+                  <a14:hiddenLine xmlns="" xmlns:a14="http://schemas.microsoft.com/office/drawing/2010/main" w="9525">
                     <a:solidFill>
                       <a:srgbClr val="000000"/>
                     </a:solidFill>
@@ -9223,7 +9228,7 @@
               </a:ln>
               <a:extLst>
                 <a:ext uri="{91240B29-F687-4f45-9708-019B960494DF}">
-                  <a14:hiddenLine xmlns:a14="http://schemas.microsoft.com/office/drawing/2010/main" xmlns="" w="9525">
+                  <a14:hiddenLine xmlns="" xmlns:a14="http://schemas.microsoft.com/office/drawing/2010/main" w="9525">
                     <a:solidFill>
                       <a:srgbClr val="000000"/>
                     </a:solidFill>
@@ -9285,7 +9290,7 @@
               </a:ln>
               <a:extLst>
                 <a:ext uri="{91240B29-F687-4f45-9708-019B960494DF}">
-                  <a14:hiddenLine xmlns:a14="http://schemas.microsoft.com/office/drawing/2010/main" xmlns="" w="9525">
+                  <a14:hiddenLine xmlns="" xmlns:a14="http://schemas.microsoft.com/office/drawing/2010/main" w="9525">
                     <a:solidFill>
                       <a:srgbClr val="000000"/>
                     </a:solidFill>
@@ -9375,7 +9380,7 @@
               </a:ln>
               <a:extLst>
                 <a:ext uri="{91240B29-F687-4f45-9708-019B960494DF}">
-                  <a14:hiddenLine xmlns:a14="http://schemas.microsoft.com/office/drawing/2010/main" xmlns="" w="9525">
+                  <a14:hiddenLine xmlns="" xmlns:a14="http://schemas.microsoft.com/office/drawing/2010/main" w="9525">
                     <a:solidFill>
                       <a:srgbClr val="000000"/>
                     </a:solidFill>
@@ -9437,7 +9442,7 @@
               </a:ln>
               <a:extLst>
                 <a:ext uri="{91240B29-F687-4f45-9708-019B960494DF}">
-                  <a14:hiddenLine xmlns:a14="http://schemas.microsoft.com/office/drawing/2010/main" xmlns="" w="9525">
+                  <a14:hiddenLine xmlns="" xmlns:a14="http://schemas.microsoft.com/office/drawing/2010/main" w="9525">
                     <a:solidFill>
                       <a:srgbClr val="000000"/>
                     </a:solidFill>
@@ -9499,7 +9504,7 @@
               </a:ln>
               <a:extLst>
                 <a:ext uri="{91240B29-F687-4f45-9708-019B960494DF}">
-                  <a14:hiddenLine xmlns:a14="http://schemas.microsoft.com/office/drawing/2010/main" xmlns="" w="9525">
+                  <a14:hiddenLine xmlns="" xmlns:a14="http://schemas.microsoft.com/office/drawing/2010/main" w="9525">
                     <a:solidFill>
                       <a:srgbClr val="000000"/>
                     </a:solidFill>
@@ -9589,7 +9594,7 @@
               </a:ln>
               <a:extLst>
                 <a:ext uri="{91240B29-F687-4f45-9708-019B960494DF}">
-                  <a14:hiddenLine xmlns:a14="http://schemas.microsoft.com/office/drawing/2010/main" xmlns="" w="9525">
+                  <a14:hiddenLine xmlns="" xmlns:a14="http://schemas.microsoft.com/office/drawing/2010/main" w="9525">
                     <a:solidFill>
                       <a:srgbClr val="000000"/>
                     </a:solidFill>
@@ -9679,7 +9684,7 @@
               </a:ln>
               <a:extLst>
                 <a:ext uri="{91240B29-F687-4f45-9708-019B960494DF}">
-                  <a14:hiddenLine xmlns:a14="http://schemas.microsoft.com/office/drawing/2010/main" xmlns="" w="9525">
+                  <a14:hiddenLine xmlns="" xmlns:a14="http://schemas.microsoft.com/office/drawing/2010/main" w="9525">
                     <a:solidFill>
                       <a:srgbClr val="000000"/>
                     </a:solidFill>
@@ -9741,7 +9746,7 @@
               </a:ln>
               <a:extLst>
                 <a:ext uri="{91240B29-F687-4f45-9708-019B960494DF}">
-                  <a14:hiddenLine xmlns:a14="http://schemas.microsoft.com/office/drawing/2010/main" xmlns="" w="9525">
+                  <a14:hiddenLine xmlns="" xmlns:a14="http://schemas.microsoft.com/office/drawing/2010/main" w="9525">
                     <a:solidFill>
                       <a:srgbClr val="000000"/>
                     </a:solidFill>
@@ -9851,7 +9856,7 @@
               </a:ln>
               <a:extLst>
                 <a:ext uri="{91240B29-F687-4f45-9708-019B960494DF}">
-                  <a14:hiddenLine xmlns:a14="http://schemas.microsoft.com/office/drawing/2010/main" xmlns="" w="9525">
+                  <a14:hiddenLine xmlns="" xmlns:a14="http://schemas.microsoft.com/office/drawing/2010/main" w="9525">
                     <a:solidFill>
                       <a:srgbClr val="000000"/>
                     </a:solidFill>
@@ -9935,7 +9940,7 @@
               </a:ln>
               <a:extLst>
                 <a:ext uri="{91240B29-F687-4f45-9708-019B960494DF}">
-                  <a14:hiddenLine xmlns:a14="http://schemas.microsoft.com/office/drawing/2010/main" xmlns="" w="9525">
+                  <a14:hiddenLine xmlns="" xmlns:a14="http://schemas.microsoft.com/office/drawing/2010/main" w="9525">
                     <a:solidFill>
                       <a:srgbClr val="000000"/>
                     </a:solidFill>
@@ -9997,7 +10002,7 @@
               </a:ln>
               <a:extLst>
                 <a:ext uri="{91240B29-F687-4f45-9708-019B960494DF}">
-                  <a14:hiddenLine xmlns:a14="http://schemas.microsoft.com/office/drawing/2010/main" xmlns="" w="9525">
+                  <a14:hiddenLine xmlns="" xmlns:a14="http://schemas.microsoft.com/office/drawing/2010/main" w="9525">
                     <a:solidFill>
                       <a:srgbClr val="000000"/>
                     </a:solidFill>
@@ -10059,7 +10064,7 @@
               </a:ln>
               <a:extLst>
                 <a:ext uri="{91240B29-F687-4f45-9708-019B960494DF}">
-                  <a14:hiddenLine xmlns:a14="http://schemas.microsoft.com/office/drawing/2010/main" xmlns="" w="9525">
+                  <a14:hiddenLine xmlns="" xmlns:a14="http://schemas.microsoft.com/office/drawing/2010/main" w="9525">
                     <a:solidFill>
                       <a:srgbClr val="000000"/>
                     </a:solidFill>
@@ -10149,7 +10154,7 @@
               </a:ln>
               <a:extLst>
                 <a:ext uri="{91240B29-F687-4f45-9708-019B960494DF}">
-                  <a14:hiddenLine xmlns:a14="http://schemas.microsoft.com/office/drawing/2010/main" xmlns="" w="9525">
+                  <a14:hiddenLine xmlns="" xmlns:a14="http://schemas.microsoft.com/office/drawing/2010/main" w="9525">
                     <a:solidFill>
                       <a:srgbClr val="000000"/>
                     </a:solidFill>
@@ -10183,7 +10188,7 @@
               </a:ln>
               <a:extLst>
                 <a:ext uri="{91240B29-F687-4f45-9708-019B960494DF}">
-                  <a14:hiddenLine xmlns:a14="http://schemas.microsoft.com/office/drawing/2010/main" xmlns="" w="9525">
+                  <a14:hiddenLine xmlns="" xmlns:a14="http://schemas.microsoft.com/office/drawing/2010/main" w="9525">
                     <a:solidFill>
                       <a:srgbClr val="000000"/>
                     </a:solidFill>
@@ -10248,7 +10253,7 @@
               </a:ln>
               <a:extLst>
                 <a:ext uri="{91240B29-F687-4f45-9708-019B960494DF}">
-                  <a14:hiddenLine xmlns:a14="http://schemas.microsoft.com/office/drawing/2010/main" xmlns="" w="9525">
+                  <a14:hiddenLine xmlns="" xmlns:a14="http://schemas.microsoft.com/office/drawing/2010/main" w="9525">
                     <a:solidFill>
                       <a:srgbClr val="000000"/>
                     </a:solidFill>
@@ -10338,7 +10343,7 @@
               </a:ln>
               <a:extLst>
                 <a:ext uri="{91240B29-F687-4f45-9708-019B960494DF}">
-                  <a14:hiddenLine xmlns:a14="http://schemas.microsoft.com/office/drawing/2010/main" xmlns="" w="9525">
+                  <a14:hiddenLine xmlns="" xmlns:a14="http://schemas.microsoft.com/office/drawing/2010/main" w="9525">
                     <a:solidFill>
                       <a:srgbClr val="000000"/>
                     </a:solidFill>
@@ -10400,7 +10405,7 @@
               </a:ln>
               <a:extLst>
                 <a:ext uri="{91240B29-F687-4f45-9708-019B960494DF}">
-                  <a14:hiddenLine xmlns:a14="http://schemas.microsoft.com/office/drawing/2010/main" xmlns="" w="9525">
+                  <a14:hiddenLine xmlns="" xmlns:a14="http://schemas.microsoft.com/office/drawing/2010/main" w="9525">
                     <a:solidFill>
                       <a:srgbClr val="000000"/>
                     </a:solidFill>
@@ -10490,7 +10495,7 @@
               </a:ln>
               <a:extLst>
                 <a:ext uri="{91240B29-F687-4f45-9708-019B960494DF}">
-                  <a14:hiddenLine xmlns:a14="http://schemas.microsoft.com/office/drawing/2010/main" xmlns="" w="9525">
+                  <a14:hiddenLine xmlns="" xmlns:a14="http://schemas.microsoft.com/office/drawing/2010/main" w="9525">
                     <a:solidFill>
                       <a:srgbClr val="000000"/>
                     </a:solidFill>
@@ -10555,7 +10560,7 @@
               </a:ln>
               <a:extLst>
                 <a:ext uri="{91240B29-F687-4f45-9708-019B960494DF}">
-                  <a14:hiddenLine xmlns:a14="http://schemas.microsoft.com/office/drawing/2010/main" xmlns="" w="9525">
+                  <a14:hiddenLine xmlns="" xmlns:a14="http://schemas.microsoft.com/office/drawing/2010/main" w="9525">
                     <a:solidFill>
                       <a:srgbClr val="000000"/>
                     </a:solidFill>
@@ -10617,7 +10622,7 @@
               </a:ln>
               <a:extLst>
                 <a:ext uri="{91240B29-F687-4f45-9708-019B960494DF}">
-                  <a14:hiddenLine xmlns:a14="http://schemas.microsoft.com/office/drawing/2010/main" xmlns="" w="9525">
+                  <a14:hiddenLine xmlns="" xmlns:a14="http://schemas.microsoft.com/office/drawing/2010/main" w="9525">
                     <a:solidFill>
                       <a:srgbClr val="000000"/>
                     </a:solidFill>
@@ -10707,7 +10712,7 @@
               </a:ln>
               <a:extLst>
                 <a:ext uri="{91240B29-F687-4f45-9708-019B960494DF}">
-                  <a14:hiddenLine xmlns:a14="http://schemas.microsoft.com/office/drawing/2010/main" xmlns="" w="9525">
+                  <a14:hiddenLine xmlns="" xmlns:a14="http://schemas.microsoft.com/office/drawing/2010/main" w="9525">
                     <a:solidFill>
                       <a:srgbClr val="000000"/>
                     </a:solidFill>
@@ -10797,7 +10802,7 @@
               </a:ln>
               <a:extLst>
                 <a:ext uri="{91240B29-F687-4f45-9708-019B960494DF}">
-                  <a14:hiddenLine xmlns:a14="http://schemas.microsoft.com/office/drawing/2010/main" xmlns="" w="9525">
+                  <a14:hiddenLine xmlns="" xmlns:a14="http://schemas.microsoft.com/office/drawing/2010/main" w="9525">
                     <a:solidFill>
                       <a:srgbClr val="000000"/>
                     </a:solidFill>
@@ -10862,7 +10867,7 @@
               </a:ln>
               <a:extLst>
                 <a:ext uri="{91240B29-F687-4f45-9708-019B960494DF}">
-                  <a14:hiddenLine xmlns:a14="http://schemas.microsoft.com/office/drawing/2010/main" xmlns="" w="9525">
+                  <a14:hiddenLine xmlns="" xmlns:a14="http://schemas.microsoft.com/office/drawing/2010/main" w="9525">
                     <a:solidFill>
                       <a:srgbClr val="000000"/>
                     </a:solidFill>
@@ -10982,7 +10987,7 @@
               </a:ln>
               <a:extLst>
                 <a:ext uri="{91240B29-F687-4f45-9708-019B960494DF}">
-                  <a14:hiddenLine xmlns:a14="http://schemas.microsoft.com/office/drawing/2010/main" xmlns="" w="9525">
+                  <a14:hiddenLine xmlns="" xmlns:a14="http://schemas.microsoft.com/office/drawing/2010/main" w="9525">
                     <a:solidFill>
                       <a:srgbClr val="000000"/>
                     </a:solidFill>
@@ -11080,7 +11085,7 @@
               </a:ln>
               <a:extLst>
                 <a:ext uri="{91240B29-F687-4f45-9708-019B960494DF}">
-                  <a14:hiddenLine xmlns:a14="http://schemas.microsoft.com/office/drawing/2010/main" xmlns="" w="9525">
+                  <a14:hiddenLine xmlns="" xmlns:a14="http://schemas.microsoft.com/office/drawing/2010/main" w="9525">
                     <a:solidFill>
                       <a:srgbClr val="000000"/>
                     </a:solidFill>
@@ -11195,7 +11200,7 @@
               </a:ln>
               <a:extLst>
                 <a:ext uri="{91240B29-F687-4f45-9708-019B960494DF}">
-                  <a14:hiddenLine xmlns:a14="http://schemas.microsoft.com/office/drawing/2010/main" xmlns="" w="9525">
+                  <a14:hiddenLine xmlns="" xmlns:a14="http://schemas.microsoft.com/office/drawing/2010/main" w="9525">
                     <a:solidFill>
                       <a:srgbClr val="000000"/>
                     </a:solidFill>
@@ -11285,7 +11290,7 @@
               </a:ln>
               <a:extLst>
                 <a:ext uri="{91240B29-F687-4f45-9708-019B960494DF}">
-                  <a14:hiddenLine xmlns:a14="http://schemas.microsoft.com/office/drawing/2010/main" xmlns="" w="9525">
+                  <a14:hiddenLine xmlns="" xmlns:a14="http://schemas.microsoft.com/office/drawing/2010/main" w="9525">
                     <a:solidFill>
                       <a:srgbClr val="000000"/>
                     </a:solidFill>
@@ -11350,7 +11355,7 @@
               </a:ln>
               <a:extLst>
                 <a:ext uri="{91240B29-F687-4f45-9708-019B960494DF}">
-                  <a14:hiddenLine xmlns:a14="http://schemas.microsoft.com/office/drawing/2010/main" xmlns="" w="9525">
+                  <a14:hiddenLine xmlns="" xmlns:a14="http://schemas.microsoft.com/office/drawing/2010/main" w="9525">
                     <a:solidFill>
                       <a:srgbClr val="000000"/>
                     </a:solidFill>
@@ -11440,7 +11445,7 @@
               </a:ln>
               <a:extLst>
                 <a:ext uri="{91240B29-F687-4f45-9708-019B960494DF}">
-                  <a14:hiddenLine xmlns:a14="http://schemas.microsoft.com/office/drawing/2010/main" xmlns="" w="9525">
+                  <a14:hiddenLine xmlns="" xmlns:a14="http://schemas.microsoft.com/office/drawing/2010/main" w="9525">
                     <a:solidFill>
                       <a:srgbClr val="000000"/>
                     </a:solidFill>
@@ -11508,7 +11513,7 @@
               </a:ln>
               <a:extLst>
                 <a:ext uri="{91240B29-F687-4f45-9708-019B960494DF}">
-                  <a14:hiddenLine xmlns:a14="http://schemas.microsoft.com/office/drawing/2010/main" xmlns="" w="9525">
+                  <a14:hiddenLine xmlns="" xmlns:a14="http://schemas.microsoft.com/office/drawing/2010/main" w="9525">
                     <a:solidFill>
                       <a:srgbClr val="000000"/>
                     </a:solidFill>
@@ -11598,7 +11603,7 @@
               </a:ln>
               <a:extLst>
                 <a:ext uri="{91240B29-F687-4f45-9708-019B960494DF}">
-                  <a14:hiddenLine xmlns:a14="http://schemas.microsoft.com/office/drawing/2010/main" xmlns="" w="9525">
+                  <a14:hiddenLine xmlns="" xmlns:a14="http://schemas.microsoft.com/office/drawing/2010/main" w="9525">
                     <a:solidFill>
                       <a:srgbClr val="000000"/>
                     </a:solidFill>
@@ -11666,7 +11671,7 @@
               </a:ln>
               <a:extLst>
                 <a:ext uri="{91240B29-F687-4f45-9708-019B960494DF}">
-                  <a14:hiddenLine xmlns:a14="http://schemas.microsoft.com/office/drawing/2010/main" xmlns="" w="9525">
+                  <a14:hiddenLine xmlns="" xmlns:a14="http://schemas.microsoft.com/office/drawing/2010/main" w="9525">
                     <a:solidFill>
                       <a:srgbClr val="000000"/>
                     </a:solidFill>
@@ -11756,7 +11761,7 @@
               </a:ln>
               <a:extLst>
                 <a:ext uri="{91240B29-F687-4f45-9708-019B960494DF}">
-                  <a14:hiddenLine xmlns:a14="http://schemas.microsoft.com/office/drawing/2010/main" xmlns="" w="9525">
+                  <a14:hiddenLine xmlns="" xmlns:a14="http://schemas.microsoft.com/office/drawing/2010/main" w="9525">
                     <a:solidFill>
                       <a:srgbClr val="000000"/>
                     </a:solidFill>
@@ -11790,7 +11795,7 @@
               </a:ln>
               <a:extLst>
                 <a:ext uri="{91240B29-F687-4f45-9708-019B960494DF}">
-                  <a14:hiddenLine xmlns:a14="http://schemas.microsoft.com/office/drawing/2010/main" xmlns="" w="9525">
+                  <a14:hiddenLine xmlns="" xmlns:a14="http://schemas.microsoft.com/office/drawing/2010/main" w="9525">
                     <a:solidFill>
                       <a:srgbClr val="000000"/>
                     </a:solidFill>
@@ -11931,7 +11936,7 @@
             <a:fld id="{48A87A34-81AB-432B-8DAE-1953F412C126}" type="datetimeFigureOut">
               <a:rPr lang="en-US" dirty="0"/>
               <a:pPr/>
-              <a:t>10/23/24</a:t>
+              <a:t>10/24/24</a:t>
             </a:fld>
             <a:endParaRPr lang="en-US" dirty="0"/>
           </a:p>

</xml_diff>